<commit_message>
Presentation updated from remote.
</commit_message>
<xml_diff>
--- a/PRESENTATION/JavaScript1.pptx
+++ b/PRESENTATION/JavaScript1.pptx
@@ -5,10 +5,11 @@
     <p:sldMasterId id="2147483673" r:id="rId1"/>
   </p:sldMasterIdLst>
   <p:notesMasterIdLst>
-    <p:notesMasterId r:id="rId3"/>
+    <p:notesMasterId r:id="rId4"/>
   </p:notesMasterIdLst>
   <p:sldIdLst>
     <p:sldId id="438" r:id="rId2"/>
+    <p:sldId id="439" r:id="rId3"/>
   </p:sldIdLst>
   <p:sldSz cx="9144000" cy="5143500" type="screen16x9"/>
   <p:notesSz cx="6858000" cy="9144000"/>
@@ -109,7 +110,7 @@
   </p:defaultTextStyle>
   <p:extLst>
     <p:ext uri="{EFAFB233-063F-42B5-8137-9DF3F51BA10A}">
-      <p15:sldGuideLst xmlns="" xmlns:p15="http://schemas.microsoft.com/office/powerpoint/2012/main">
+      <p15:sldGuideLst xmlns:p15="http://schemas.microsoft.com/office/powerpoint/2012/main">
         <p15:guide id="1" orient="horz" pos="2160" userDrawn="1">
           <p15:clr>
             <a:srgbClr val="A4A3A4"/>
@@ -128,7 +129,7 @@
       </p15:sldGuideLst>
     </p:ext>
     <p:ext uri="{2D200454-40CA-4A62-9FC3-DE9A4176ACB9}">
-      <p15:notesGuideLst xmlns="" xmlns:p15="http://schemas.microsoft.com/office/powerpoint/2012/main">
+      <p15:notesGuideLst xmlns:p15="http://schemas.microsoft.com/office/powerpoint/2012/main">
         <p15:guide id="1" orient="horz" pos="2880">
           <p15:clr>
             <a:srgbClr val="A4A3A4"/>
@@ -150,14 +151,14 @@
   <p:cmAuthor id="1" name="EG1" initials="E" lastIdx="1" clrIdx="0">
     <p:extLst>
       <p:ext uri="{19B8F6BF-5375-455C-9EA6-DF929625EA0E}">
-        <p15:presenceInfo xmlns="" xmlns:p15="http://schemas.microsoft.com/office/powerpoint/2012/main" userId="EG1" providerId="None"/>
+        <p15:presenceInfo xmlns:p15="http://schemas.microsoft.com/office/powerpoint/2012/main" userId="EG1" providerId="None"/>
       </p:ext>
     </p:extLst>
   </p:cmAuthor>
   <p:cmAuthor id="2" name="Софрыгин Лука, LS4" initials="СЛL" lastIdx="1" clrIdx="1">
     <p:extLst>
       <p:ext uri="{19B8F6BF-5375-455C-9EA6-DF929625EA0E}">
-        <p15:presenceInfo xmlns="" xmlns:p15="http://schemas.microsoft.com/office/powerpoint/2012/main" userId="S-1-5-21-625263247-1454195203-2169808520-12693" providerId="AD"/>
+        <p15:presenceInfo xmlns:p15="http://schemas.microsoft.com/office/powerpoint/2012/main" userId="S-1-5-21-625263247-1454195203-2169808520-12693" providerId="AD"/>
       </p:ext>
     </p:extLst>
   </p:cmAuthor>
@@ -247,7 +248,7 @@
             <a:fld id="{6382EAE9-AAF6-4AB1-9F59-9F984DBCDFBC}" type="datetimeFigureOut">
               <a:rPr lang="ru-RU" smtClean="0"/>
               <a:pPr/>
-              <a:t>26.06.2024</a:t>
+              <a:t>27.06.2024</a:t>
             </a:fld>
             <a:endParaRPr lang="ru-RU"/>
           </a:p>
@@ -311,38 +312,37 @@
           <a:p>
             <a:pPr lvl="0"/>
             <a:r>
-              <a:rPr lang="ru-RU" smtClean="0"/>
+              <a:rPr lang="ru-RU"/>
               <a:t>Образец текста</a:t>
             </a:r>
           </a:p>
           <a:p>
             <a:pPr lvl="1"/>
             <a:r>
-              <a:rPr lang="ru-RU" smtClean="0"/>
+              <a:rPr lang="ru-RU"/>
               <a:t>Второй уровень</a:t>
             </a:r>
           </a:p>
           <a:p>
             <a:pPr lvl="2"/>
             <a:r>
-              <a:rPr lang="ru-RU" smtClean="0"/>
+              <a:rPr lang="ru-RU"/>
               <a:t>Третий уровень</a:t>
             </a:r>
           </a:p>
           <a:p>
             <a:pPr lvl="3"/>
             <a:r>
-              <a:rPr lang="ru-RU" smtClean="0"/>
+              <a:rPr lang="ru-RU"/>
               <a:t>Четвертый уровень</a:t>
             </a:r>
           </a:p>
           <a:p>
             <a:pPr lvl="4"/>
             <a:r>
-              <a:rPr lang="ru-RU" smtClean="0"/>
+              <a:rPr lang="ru-RU"/>
               <a:t>Пятый уровень</a:t>
             </a:r>
-            <a:endParaRPr lang="ru-RU"/>
           </a:p>
         </p:txBody>
       </p:sp>
@@ -416,7 +416,7 @@
     </p:spTree>
     <p:extLst>
       <p:ext uri="{BB962C8B-B14F-4D97-AF65-F5344CB8AC3E}">
-        <p14:creationId xmlns="" xmlns:p14="http://schemas.microsoft.com/office/powerpoint/2010/main" val="1098649122"/>
+        <p14:creationId xmlns:p14="http://schemas.microsoft.com/office/powerpoint/2010/main" val="1098649122"/>
       </p:ext>
     </p:extLst>
   </p:cSld>
@@ -591,7 +591,7 @@
     </p:spTree>
     <p:extLst>
       <p:ext uri="{BB962C8B-B14F-4D97-AF65-F5344CB8AC3E}">
-        <p14:creationId xmlns="" xmlns:p14="http://schemas.microsoft.com/office/powerpoint/2010/main" val="2251584954"/>
+        <p14:creationId xmlns:p14="http://schemas.microsoft.com/office/powerpoint/2010/main" val="2251584954"/>
       </p:ext>
     </p:extLst>
   </p:cSld>
@@ -676,7 +676,7 @@
           </a:lstStyle>
           <a:p>
             <a:r>
-              <a:rPr lang="ru-RU" smtClean="0"/>
+              <a:rPr lang="ru-RU"/>
               <a:t>Образец подзаголовка</a:t>
             </a:r>
             <a:endParaRPr lang="en-US" dirty="0"/>
@@ -781,7 +781,7 @@
           </a:lstStyle>
           <a:p>
             <a:r>
-              <a:rPr lang="ru-RU" smtClean="0"/>
+              <a:rPr lang="ru-RU"/>
               <a:t>Образец заголовка</a:t>
             </a:r>
             <a:endParaRPr lang="en-US" dirty="0"/>
@@ -791,20 +791,13 @@
     </p:spTree>
     <p:extLst>
       <p:ext uri="{BB962C8B-B14F-4D97-AF65-F5344CB8AC3E}">
-        <p14:creationId xmlns="" xmlns:p14="http://schemas.microsoft.com/office/powerpoint/2010/main" val="1040083674"/>
+        <p14:creationId xmlns:p14="http://schemas.microsoft.com/office/powerpoint/2010/main" val="1040083674"/>
       </p:ext>
     </p:extLst>
   </p:cSld>
   <p:clrMapOvr>
     <a:masterClrMapping/>
   </p:clrMapOvr>
-  <p:timing>
-    <p:tnLst>
-      <p:par>
-        <p:cTn id="1" dur="indefinite" restart="never" nodeType="tmRoot"/>
-      </p:par>
-    </p:tnLst>
-  </p:timing>
 </p:sldLayout>
 </file>
 
@@ -841,7 +834,7 @@
           <a:lstStyle/>
           <a:p>
             <a:r>
-              <a:rPr lang="ru-RU" smtClean="0"/>
+              <a:rPr lang="ru-RU"/>
               <a:t>Образец заголовка</a:t>
             </a:r>
             <a:endParaRPr lang="en-US" dirty="0"/>
@@ -865,35 +858,35 @@
           <a:p>
             <a:pPr lvl="0"/>
             <a:r>
-              <a:rPr lang="ru-RU" smtClean="0"/>
+              <a:rPr lang="ru-RU"/>
               <a:t>Образец текста</a:t>
             </a:r>
           </a:p>
           <a:p>
             <a:pPr lvl="1"/>
             <a:r>
-              <a:rPr lang="ru-RU" smtClean="0"/>
+              <a:rPr lang="ru-RU"/>
               <a:t>Второй уровень</a:t>
             </a:r>
           </a:p>
           <a:p>
             <a:pPr lvl="2"/>
             <a:r>
-              <a:rPr lang="ru-RU" smtClean="0"/>
+              <a:rPr lang="ru-RU"/>
               <a:t>Третий уровень</a:t>
             </a:r>
           </a:p>
           <a:p>
             <a:pPr lvl="3"/>
             <a:r>
-              <a:rPr lang="ru-RU" smtClean="0"/>
+              <a:rPr lang="ru-RU"/>
               <a:t>Четвертый уровень</a:t>
             </a:r>
           </a:p>
           <a:p>
             <a:pPr lvl="4"/>
             <a:r>
-              <a:rPr lang="ru-RU" smtClean="0"/>
+              <a:rPr lang="ru-RU"/>
               <a:t>Пятый уровень</a:t>
             </a:r>
             <a:endParaRPr lang="en-US" dirty="0"/>
@@ -976,7 +969,7 @@
     </p:spTree>
     <p:extLst>
       <p:ext uri="{BB962C8B-B14F-4D97-AF65-F5344CB8AC3E}">
-        <p14:creationId xmlns="" xmlns:p14="http://schemas.microsoft.com/office/powerpoint/2010/main" val="897323393"/>
+        <p14:creationId xmlns:p14="http://schemas.microsoft.com/office/powerpoint/2010/main" val="897323393"/>
       </p:ext>
     </p:extLst>
   </p:cSld>
@@ -1024,7 +1017,7 @@
           <a:lstStyle/>
           <a:p>
             <a:r>
-              <a:rPr lang="ru-RU" smtClean="0"/>
+              <a:rPr lang="ru-RU"/>
               <a:t>Образец заголовка</a:t>
             </a:r>
             <a:endParaRPr lang="en-US" dirty="0"/>
@@ -1053,35 +1046,35 @@
           <a:p>
             <a:pPr lvl="0"/>
             <a:r>
-              <a:rPr lang="ru-RU" smtClean="0"/>
+              <a:rPr lang="ru-RU"/>
               <a:t>Образец текста</a:t>
             </a:r>
           </a:p>
           <a:p>
             <a:pPr lvl="1"/>
             <a:r>
-              <a:rPr lang="ru-RU" smtClean="0"/>
+              <a:rPr lang="ru-RU"/>
               <a:t>Второй уровень</a:t>
             </a:r>
           </a:p>
           <a:p>
             <a:pPr lvl="2"/>
             <a:r>
-              <a:rPr lang="ru-RU" smtClean="0"/>
+              <a:rPr lang="ru-RU"/>
               <a:t>Третий уровень</a:t>
             </a:r>
           </a:p>
           <a:p>
             <a:pPr lvl="3"/>
             <a:r>
-              <a:rPr lang="ru-RU" smtClean="0"/>
+              <a:rPr lang="ru-RU"/>
               <a:t>Четвертый уровень</a:t>
             </a:r>
           </a:p>
           <a:p>
             <a:pPr lvl="4"/>
             <a:r>
-              <a:rPr lang="ru-RU" smtClean="0"/>
+              <a:rPr lang="ru-RU"/>
               <a:t>Пятый уровень</a:t>
             </a:r>
             <a:endParaRPr lang="en-US" dirty="0"/>
@@ -1164,20 +1157,13 @@
     </p:spTree>
     <p:extLst>
       <p:ext uri="{BB962C8B-B14F-4D97-AF65-F5344CB8AC3E}">
-        <p14:creationId xmlns="" xmlns:p14="http://schemas.microsoft.com/office/powerpoint/2010/main" val="723154028"/>
+        <p14:creationId xmlns:p14="http://schemas.microsoft.com/office/powerpoint/2010/main" val="723154028"/>
       </p:ext>
     </p:extLst>
   </p:cSld>
   <p:clrMapOvr>
     <a:masterClrMapping/>
   </p:clrMapOvr>
-  <p:timing>
-    <p:tnLst>
-      <p:par>
-        <p:cTn id="1" dur="indefinite" restart="never" nodeType="tmRoot"/>
-      </p:par>
-    </p:tnLst>
-  </p:timing>
 </p:sldLayout>
 </file>
 
@@ -1233,7 +1219,7 @@
           </a:lstStyle>
           <a:p>
             <a:r>
-              <a:rPr lang="ru-RU" dirty="0" smtClean="0"/>
+              <a:rPr lang="ru-RU" dirty="0"/>
               <a:t>Образец заголовка</a:t>
             </a:r>
             <a:endParaRPr lang="en-US" dirty="0"/>
@@ -1257,35 +1243,35 @@
           <a:p>
             <a:pPr lvl="0"/>
             <a:r>
-              <a:rPr lang="ru-RU" smtClean="0"/>
+              <a:rPr lang="ru-RU"/>
               <a:t>Образец текста</a:t>
             </a:r>
           </a:p>
           <a:p>
             <a:pPr lvl="1"/>
             <a:r>
-              <a:rPr lang="ru-RU" smtClean="0"/>
+              <a:rPr lang="ru-RU"/>
               <a:t>Второй уровень</a:t>
             </a:r>
           </a:p>
           <a:p>
             <a:pPr lvl="2"/>
             <a:r>
-              <a:rPr lang="ru-RU" smtClean="0"/>
+              <a:rPr lang="ru-RU"/>
               <a:t>Третий уровень</a:t>
             </a:r>
           </a:p>
           <a:p>
             <a:pPr lvl="3"/>
             <a:r>
-              <a:rPr lang="ru-RU" smtClean="0"/>
+              <a:rPr lang="ru-RU"/>
               <a:t>Четвертый уровень</a:t>
             </a:r>
           </a:p>
           <a:p>
             <a:pPr lvl="4"/>
             <a:r>
-              <a:rPr lang="ru-RU" smtClean="0"/>
+              <a:rPr lang="ru-RU"/>
               <a:t>Пятый уровень</a:t>
             </a:r>
             <a:endParaRPr lang="en-US" dirty="0"/>
@@ -1368,20 +1354,13 @@
     </p:spTree>
     <p:extLst>
       <p:ext uri="{BB962C8B-B14F-4D97-AF65-F5344CB8AC3E}">
-        <p14:creationId xmlns="" xmlns:p14="http://schemas.microsoft.com/office/powerpoint/2010/main" val="2914621632"/>
+        <p14:creationId xmlns:p14="http://schemas.microsoft.com/office/powerpoint/2010/main" val="2914621632"/>
       </p:ext>
     </p:extLst>
   </p:cSld>
   <p:clrMapOvr>
     <a:masterClrMapping/>
   </p:clrMapOvr>
-  <p:timing>
-    <p:tnLst>
-      <p:par>
-        <p:cTn id="1" dur="indefinite" restart="never" nodeType="tmRoot"/>
-      </p:par>
-    </p:tnLst>
-  </p:timing>
 </p:sldLayout>
 </file>
 
@@ -1427,7 +1406,7 @@
           </a:lstStyle>
           <a:p>
             <a:r>
-              <a:rPr lang="ru-RU" smtClean="0"/>
+              <a:rPr lang="ru-RU"/>
               <a:t>Образец заголовка</a:t>
             </a:r>
             <a:endParaRPr lang="en-US" dirty="0"/>
@@ -1545,7 +1524,7 @@
           <a:p>
             <a:pPr lvl="0"/>
             <a:r>
-              <a:rPr lang="ru-RU" smtClean="0"/>
+              <a:rPr lang="ru-RU"/>
               <a:t>Образец текста</a:t>
             </a:r>
           </a:p>
@@ -1627,20 +1606,13 @@
     </p:spTree>
     <p:extLst>
       <p:ext uri="{BB962C8B-B14F-4D97-AF65-F5344CB8AC3E}">
-        <p14:creationId xmlns="" xmlns:p14="http://schemas.microsoft.com/office/powerpoint/2010/main" val="2779696601"/>
+        <p14:creationId xmlns:p14="http://schemas.microsoft.com/office/powerpoint/2010/main" val="2779696601"/>
       </p:ext>
     </p:extLst>
   </p:cSld>
   <p:clrMapOvr>
     <a:masterClrMapping/>
   </p:clrMapOvr>
-  <p:timing>
-    <p:tnLst>
-      <p:par>
-        <p:cTn id="1" dur="indefinite" restart="never" nodeType="tmRoot"/>
-      </p:par>
-    </p:tnLst>
-  </p:timing>
 </p:sldLayout>
 </file>
 
@@ -1677,7 +1649,7 @@
           <a:lstStyle/>
           <a:p>
             <a:r>
-              <a:rPr lang="ru-RU" dirty="0" smtClean="0"/>
+              <a:rPr lang="ru-RU" dirty="0"/>
               <a:t>Образец заголовка</a:t>
             </a:r>
             <a:endParaRPr lang="en-US" dirty="0"/>
@@ -1706,35 +1678,35 @@
           <a:p>
             <a:pPr lvl="0"/>
             <a:r>
-              <a:rPr lang="ru-RU" smtClean="0"/>
+              <a:rPr lang="ru-RU"/>
               <a:t>Образец текста</a:t>
             </a:r>
           </a:p>
           <a:p>
             <a:pPr lvl="1"/>
             <a:r>
-              <a:rPr lang="ru-RU" smtClean="0"/>
+              <a:rPr lang="ru-RU"/>
               <a:t>Второй уровень</a:t>
             </a:r>
           </a:p>
           <a:p>
             <a:pPr lvl="2"/>
             <a:r>
-              <a:rPr lang="ru-RU" smtClean="0"/>
+              <a:rPr lang="ru-RU"/>
               <a:t>Третий уровень</a:t>
             </a:r>
           </a:p>
           <a:p>
             <a:pPr lvl="3"/>
             <a:r>
-              <a:rPr lang="ru-RU" smtClean="0"/>
+              <a:rPr lang="ru-RU"/>
               <a:t>Четвертый уровень</a:t>
             </a:r>
           </a:p>
           <a:p>
             <a:pPr lvl="4"/>
             <a:r>
-              <a:rPr lang="ru-RU" smtClean="0"/>
+              <a:rPr lang="ru-RU"/>
               <a:t>Пятый уровень</a:t>
             </a:r>
             <a:endParaRPr lang="en-US" dirty="0"/>
@@ -1763,35 +1735,35 @@
           <a:p>
             <a:pPr lvl="0"/>
             <a:r>
-              <a:rPr lang="ru-RU" smtClean="0"/>
+              <a:rPr lang="ru-RU"/>
               <a:t>Образец текста</a:t>
             </a:r>
           </a:p>
           <a:p>
             <a:pPr lvl="1"/>
             <a:r>
-              <a:rPr lang="ru-RU" smtClean="0"/>
+              <a:rPr lang="ru-RU"/>
               <a:t>Второй уровень</a:t>
             </a:r>
           </a:p>
           <a:p>
             <a:pPr lvl="2"/>
             <a:r>
-              <a:rPr lang="ru-RU" smtClean="0"/>
+              <a:rPr lang="ru-RU"/>
               <a:t>Третий уровень</a:t>
             </a:r>
           </a:p>
           <a:p>
             <a:pPr lvl="3"/>
             <a:r>
-              <a:rPr lang="ru-RU" smtClean="0"/>
+              <a:rPr lang="ru-RU"/>
               <a:t>Четвертый уровень</a:t>
             </a:r>
           </a:p>
           <a:p>
             <a:pPr lvl="4"/>
             <a:r>
-              <a:rPr lang="ru-RU" smtClean="0"/>
+              <a:rPr lang="ru-RU"/>
               <a:t>Пятый уровень</a:t>
             </a:r>
             <a:endParaRPr lang="en-US" dirty="0"/>
@@ -1874,20 +1846,13 @@
     </p:spTree>
     <p:extLst>
       <p:ext uri="{BB962C8B-B14F-4D97-AF65-F5344CB8AC3E}">
-        <p14:creationId xmlns="" xmlns:p14="http://schemas.microsoft.com/office/powerpoint/2010/main" val="4167738915"/>
+        <p14:creationId xmlns:p14="http://schemas.microsoft.com/office/powerpoint/2010/main" val="4167738915"/>
       </p:ext>
     </p:extLst>
   </p:cSld>
   <p:clrMapOvr>
     <a:masterClrMapping/>
   </p:clrMapOvr>
-  <p:timing>
-    <p:tnLst>
-      <p:par>
-        <p:cTn id="1" dur="indefinite" restart="never" nodeType="tmRoot"/>
-      </p:par>
-    </p:tnLst>
-  </p:timing>
 </p:sldLayout>
 </file>
 
@@ -1929,7 +1894,7 @@
           <a:lstStyle/>
           <a:p>
             <a:r>
-              <a:rPr lang="ru-RU" smtClean="0"/>
+              <a:rPr lang="ru-RU"/>
               <a:t>Образец заголовка</a:t>
             </a:r>
             <a:endParaRPr lang="en-US" dirty="0"/>
@@ -1995,7 +1960,7 @@
           <a:p>
             <a:pPr lvl="0"/>
             <a:r>
-              <a:rPr lang="ru-RU" smtClean="0"/>
+              <a:rPr lang="ru-RU"/>
               <a:t>Образец текста</a:t>
             </a:r>
           </a:p>
@@ -2023,35 +1988,35 @@
           <a:p>
             <a:pPr lvl="0"/>
             <a:r>
-              <a:rPr lang="ru-RU" smtClean="0"/>
+              <a:rPr lang="ru-RU"/>
               <a:t>Образец текста</a:t>
             </a:r>
           </a:p>
           <a:p>
             <a:pPr lvl="1"/>
             <a:r>
-              <a:rPr lang="ru-RU" smtClean="0"/>
+              <a:rPr lang="ru-RU"/>
               <a:t>Второй уровень</a:t>
             </a:r>
           </a:p>
           <a:p>
             <a:pPr lvl="2"/>
             <a:r>
-              <a:rPr lang="ru-RU" smtClean="0"/>
+              <a:rPr lang="ru-RU"/>
               <a:t>Третий уровень</a:t>
             </a:r>
           </a:p>
           <a:p>
             <a:pPr lvl="3"/>
             <a:r>
-              <a:rPr lang="ru-RU" smtClean="0"/>
+              <a:rPr lang="ru-RU"/>
               <a:t>Четвертый уровень</a:t>
             </a:r>
           </a:p>
           <a:p>
             <a:pPr lvl="4"/>
             <a:r>
-              <a:rPr lang="ru-RU" smtClean="0"/>
+              <a:rPr lang="ru-RU"/>
               <a:t>Пятый уровень</a:t>
             </a:r>
             <a:endParaRPr lang="en-US" dirty="0"/>
@@ -2117,7 +2082,7 @@
           <a:p>
             <a:pPr lvl="0"/>
             <a:r>
-              <a:rPr lang="ru-RU" smtClean="0"/>
+              <a:rPr lang="ru-RU"/>
               <a:t>Образец текста</a:t>
             </a:r>
           </a:p>
@@ -2145,35 +2110,35 @@
           <a:p>
             <a:pPr lvl="0"/>
             <a:r>
-              <a:rPr lang="ru-RU" smtClean="0"/>
+              <a:rPr lang="ru-RU"/>
               <a:t>Образец текста</a:t>
             </a:r>
           </a:p>
           <a:p>
             <a:pPr lvl="1"/>
             <a:r>
-              <a:rPr lang="ru-RU" smtClean="0"/>
+              <a:rPr lang="ru-RU"/>
               <a:t>Второй уровень</a:t>
             </a:r>
           </a:p>
           <a:p>
             <a:pPr lvl="2"/>
             <a:r>
-              <a:rPr lang="ru-RU" smtClean="0"/>
+              <a:rPr lang="ru-RU"/>
               <a:t>Третий уровень</a:t>
             </a:r>
           </a:p>
           <a:p>
             <a:pPr lvl="3"/>
             <a:r>
-              <a:rPr lang="ru-RU" smtClean="0"/>
+              <a:rPr lang="ru-RU"/>
               <a:t>Четвертый уровень</a:t>
             </a:r>
           </a:p>
           <a:p>
             <a:pPr lvl="4"/>
             <a:r>
-              <a:rPr lang="ru-RU" smtClean="0"/>
+              <a:rPr lang="ru-RU"/>
               <a:t>Пятый уровень</a:t>
             </a:r>
             <a:endParaRPr lang="en-US" dirty="0"/>
@@ -2256,7 +2221,7 @@
     </p:spTree>
     <p:extLst>
       <p:ext uri="{BB962C8B-B14F-4D97-AF65-F5344CB8AC3E}">
-        <p14:creationId xmlns="" xmlns:p14="http://schemas.microsoft.com/office/powerpoint/2010/main" val="1592117627"/>
+        <p14:creationId xmlns:p14="http://schemas.microsoft.com/office/powerpoint/2010/main" val="1592117627"/>
       </p:ext>
     </p:extLst>
   </p:cSld>
@@ -2299,7 +2264,7 @@
           <a:lstStyle/>
           <a:p>
             <a:r>
-              <a:rPr lang="ru-RU" smtClean="0"/>
+              <a:rPr lang="ru-RU"/>
               <a:t>Образец заголовка</a:t>
             </a:r>
             <a:endParaRPr lang="en-US" dirty="0"/>
@@ -2382,20 +2347,13 @@
     </p:spTree>
     <p:extLst>
       <p:ext uri="{BB962C8B-B14F-4D97-AF65-F5344CB8AC3E}">
-        <p14:creationId xmlns="" xmlns:p14="http://schemas.microsoft.com/office/powerpoint/2010/main" val="3935341663"/>
+        <p14:creationId xmlns:p14="http://schemas.microsoft.com/office/powerpoint/2010/main" val="3935341663"/>
       </p:ext>
     </p:extLst>
   </p:cSld>
   <p:clrMapOvr>
     <a:masterClrMapping/>
   </p:clrMapOvr>
-  <p:timing>
-    <p:tnLst>
-      <p:par>
-        <p:cTn id="1" dur="indefinite" restart="never" nodeType="tmRoot"/>
-      </p:par>
-    </p:tnLst>
-  </p:timing>
 </p:sldLayout>
 </file>
 
@@ -2492,20 +2450,13 @@
     </p:spTree>
     <p:extLst>
       <p:ext uri="{BB962C8B-B14F-4D97-AF65-F5344CB8AC3E}">
-        <p14:creationId xmlns="" xmlns:p14="http://schemas.microsoft.com/office/powerpoint/2010/main" val="1435130397"/>
+        <p14:creationId xmlns:p14="http://schemas.microsoft.com/office/powerpoint/2010/main" val="1435130397"/>
       </p:ext>
     </p:extLst>
   </p:cSld>
   <p:clrMapOvr>
     <a:masterClrMapping/>
   </p:clrMapOvr>
-  <p:timing>
-    <p:tnLst>
-      <p:par>
-        <p:cTn id="1" dur="indefinite" restart="never" nodeType="tmRoot"/>
-      </p:par>
-    </p:tnLst>
-  </p:timing>
 </p:sldLayout>
 </file>
 
@@ -2551,7 +2502,7 @@
           </a:lstStyle>
           <a:p>
             <a:r>
-              <a:rPr lang="ru-RU" smtClean="0"/>
+              <a:rPr lang="ru-RU"/>
               <a:t>Образец заголовка</a:t>
             </a:r>
             <a:endParaRPr lang="en-US" dirty="0"/>
@@ -2608,35 +2559,35 @@
           <a:p>
             <a:pPr lvl="0"/>
             <a:r>
-              <a:rPr lang="ru-RU" smtClean="0"/>
+              <a:rPr lang="ru-RU"/>
               <a:t>Образец текста</a:t>
             </a:r>
           </a:p>
           <a:p>
             <a:pPr lvl="1"/>
             <a:r>
-              <a:rPr lang="ru-RU" smtClean="0"/>
+              <a:rPr lang="ru-RU"/>
               <a:t>Второй уровень</a:t>
             </a:r>
           </a:p>
           <a:p>
             <a:pPr lvl="2"/>
             <a:r>
-              <a:rPr lang="ru-RU" smtClean="0"/>
+              <a:rPr lang="ru-RU"/>
               <a:t>Третий уровень</a:t>
             </a:r>
           </a:p>
           <a:p>
             <a:pPr lvl="3"/>
             <a:r>
-              <a:rPr lang="ru-RU" smtClean="0"/>
+              <a:rPr lang="ru-RU"/>
               <a:t>Четвертый уровень</a:t>
             </a:r>
           </a:p>
           <a:p>
             <a:pPr lvl="4"/>
             <a:r>
-              <a:rPr lang="ru-RU" smtClean="0"/>
+              <a:rPr lang="ru-RU"/>
               <a:t>Пятый уровень</a:t>
             </a:r>
             <a:endParaRPr lang="en-US" dirty="0"/>
@@ -2702,7 +2653,7 @@
           <a:p>
             <a:pPr lvl="0"/>
             <a:r>
-              <a:rPr lang="ru-RU" smtClean="0"/>
+              <a:rPr lang="ru-RU"/>
               <a:t>Образец текста</a:t>
             </a:r>
           </a:p>
@@ -2784,7 +2735,7 @@
     </p:spTree>
     <p:extLst>
       <p:ext uri="{BB962C8B-B14F-4D97-AF65-F5344CB8AC3E}">
-        <p14:creationId xmlns="" xmlns:p14="http://schemas.microsoft.com/office/powerpoint/2010/main" val="3763648059"/>
+        <p14:creationId xmlns:p14="http://schemas.microsoft.com/office/powerpoint/2010/main" val="3763648059"/>
       </p:ext>
     </p:extLst>
   </p:cSld>
@@ -2836,7 +2787,7 @@
           </a:lstStyle>
           <a:p>
             <a:r>
-              <a:rPr lang="ru-RU" smtClean="0"/>
+              <a:rPr lang="ru-RU"/>
               <a:t>Образец заголовка</a:t>
             </a:r>
             <a:endParaRPr lang="en-US" dirty="0"/>
@@ -2901,7 +2852,7 @@
           </a:lstStyle>
           <a:p>
             <a:r>
-              <a:rPr lang="ru-RU" smtClean="0"/>
+              <a:rPr lang="ru-RU"/>
               <a:t>Вставка рисунка</a:t>
             </a:r>
             <a:endParaRPr lang="en-US" dirty="0"/>
@@ -2967,7 +2918,7 @@
           <a:p>
             <a:pPr lvl="0"/>
             <a:r>
-              <a:rPr lang="ru-RU" smtClean="0"/>
+              <a:rPr lang="ru-RU"/>
               <a:t>Образец текста</a:t>
             </a:r>
           </a:p>
@@ -3049,7 +3000,7 @@
     </p:spTree>
     <p:extLst>
       <p:ext uri="{BB962C8B-B14F-4D97-AF65-F5344CB8AC3E}">
-        <p14:creationId xmlns="" xmlns:p14="http://schemas.microsoft.com/office/powerpoint/2010/main" val="4188210101"/>
+        <p14:creationId xmlns:p14="http://schemas.microsoft.com/office/powerpoint/2010/main" val="4188210101"/>
       </p:ext>
     </p:extLst>
   </p:cSld>
@@ -3139,7 +3090,7 @@
           <a:lstStyle/>
           <a:p>
             <a:r>
-              <a:rPr lang="ru-RU" dirty="0" smtClean="0"/>
+              <a:rPr lang="ru-RU" dirty="0"/>
               <a:t>Образец заголовка</a:t>
             </a:r>
             <a:endParaRPr lang="en-US" dirty="0"/>
@@ -3173,35 +3124,35 @@
           <a:p>
             <a:pPr lvl="0"/>
             <a:r>
-              <a:rPr lang="ru-RU" dirty="0" smtClean="0"/>
+              <a:rPr lang="ru-RU" dirty="0"/>
               <a:t>Образец текста</a:t>
             </a:r>
           </a:p>
           <a:p>
             <a:pPr lvl="1"/>
             <a:r>
-              <a:rPr lang="ru-RU" dirty="0" smtClean="0"/>
+              <a:rPr lang="ru-RU" dirty="0"/>
               <a:t>Второй уровень</a:t>
             </a:r>
           </a:p>
           <a:p>
             <a:pPr lvl="2"/>
             <a:r>
-              <a:rPr lang="ru-RU" dirty="0" smtClean="0"/>
+              <a:rPr lang="ru-RU" dirty="0"/>
               <a:t>Третий уровень</a:t>
             </a:r>
           </a:p>
           <a:p>
             <a:pPr lvl="3"/>
             <a:r>
-              <a:rPr lang="ru-RU" dirty="0" smtClean="0"/>
+              <a:rPr lang="ru-RU" dirty="0"/>
               <a:t>Четвертый уровень</a:t>
             </a:r>
           </a:p>
           <a:p>
             <a:pPr lvl="4"/>
             <a:r>
-              <a:rPr lang="ru-RU" dirty="0" smtClean="0"/>
+              <a:rPr lang="ru-RU" dirty="0"/>
               <a:t>Пятый уровень</a:t>
             </a:r>
             <a:endParaRPr lang="en-US" dirty="0"/>
@@ -3364,7 +3315,7 @@
               <a:defRPr/>
             </a:pPr>
             <a:r>
-              <a:rPr lang="en-US" sz="1800" baseline="0" dirty="0" smtClean="0">
+              <a:rPr lang="en-US" sz="1800" baseline="0" dirty="0">
                 <a:solidFill>
                   <a:schemeClr val="accent1"/>
                 </a:solidFill>
@@ -3416,14 +3367,14 @@
           </a:ln>
           <a:extLst>
             <a:ext uri="{909E8E84-426E-40DD-AFC4-6F175D3DCCD1}">
-              <a14:hiddenFill xmlns="" xmlns:a14="http://schemas.microsoft.com/office/drawing/2010/main">
+              <a14:hiddenFill xmlns:a14="http://schemas.microsoft.com/office/drawing/2010/main">
                 <a:solidFill>
                   <a:srgbClr val="FFFFFF"/>
                 </a:solidFill>
               </a14:hiddenFill>
             </a:ext>
             <a:ext uri="{91240B29-F687-4F45-9708-019B960494DF}">
-              <a14:hiddenLine xmlns="" xmlns:a14="http://schemas.microsoft.com/office/drawing/2010/main" w="9525">
+              <a14:hiddenLine xmlns:a14="http://schemas.microsoft.com/office/drawing/2010/main" w="9525">
                 <a:solidFill>
                   <a:srgbClr val="000000"/>
                 </a:solidFill>
@@ -3562,7 +3513,7 @@
               </a:pPr>
               <a:t>‹#›</a:t>
             </a:fld>
-            <a:endParaRPr lang="ru-RU" sz="1300" dirty="0" smtClean="0">
+            <a:endParaRPr lang="ru-RU" sz="1300" dirty="0">
               <a:solidFill>
                 <a:schemeClr val="bg2">
                   <a:lumMod val="75000"/>
@@ -3584,7 +3535,7 @@
           <a:blip r:embed="rId14" cstate="print">
             <a:extLst>
               <a:ext uri="{28A0092B-C50C-407E-A947-70E740481C1C}">
-                <a14:useLocalDpi xmlns="" xmlns:a14="http://schemas.microsoft.com/office/drawing/2010/main" val="0"/>
+                <a14:useLocalDpi xmlns:a14="http://schemas.microsoft.com/office/drawing/2010/main" val="0"/>
               </a:ext>
             </a:extLst>
           </a:blip>
@@ -3607,14 +3558,14 @@
           </a:ln>
           <a:extLst>
             <a:ext uri="{909E8E84-426E-40DD-AFC4-6F175D3DCCD1}">
-              <a14:hiddenFill xmlns="" xmlns:a14="http://schemas.microsoft.com/office/drawing/2010/main">
+              <a14:hiddenFill xmlns:a14="http://schemas.microsoft.com/office/drawing/2010/main">
                 <a:solidFill>
                   <a:srgbClr val="FFFFFF"/>
                 </a:solidFill>
               </a14:hiddenFill>
             </a:ext>
             <a:ext uri="{91240B29-F687-4F45-9708-019B960494DF}">
-              <a14:hiddenLine xmlns="" xmlns:a14="http://schemas.microsoft.com/office/drawing/2010/main" w="9525">
+              <a14:hiddenLine xmlns:a14="http://schemas.microsoft.com/office/drawing/2010/main" w="9525">
                 <a:solidFill>
                   <a:srgbClr val="000000"/>
                 </a:solidFill>
@@ -3638,7 +3589,7 @@
           <a:blip r:embed="rId15" cstate="print">
             <a:extLst>
               <a:ext uri="{28A0092B-C50C-407E-A947-70E740481C1C}">
-                <a14:useLocalDpi xmlns="" xmlns:a14="http://schemas.microsoft.com/office/drawing/2010/main" val="0"/>
+                <a14:useLocalDpi xmlns:a14="http://schemas.microsoft.com/office/drawing/2010/main" val="0"/>
               </a:ext>
             </a:extLst>
           </a:blip>
@@ -3661,14 +3612,14 @@
           </a:ln>
           <a:extLst>
             <a:ext uri="{909E8E84-426E-40DD-AFC4-6F175D3DCCD1}">
-              <a14:hiddenFill xmlns="" xmlns:a14="http://schemas.microsoft.com/office/drawing/2010/main">
+              <a14:hiddenFill xmlns:a14="http://schemas.microsoft.com/office/drawing/2010/main">
                 <a:solidFill>
                   <a:srgbClr val="FFFFFF"/>
                 </a:solidFill>
               </a14:hiddenFill>
             </a:ext>
             <a:ext uri="{91240B29-F687-4F45-9708-019B960494DF}">
-              <a14:hiddenLine xmlns="" xmlns:a14="http://schemas.microsoft.com/office/drawing/2010/main" w="9525">
+              <a14:hiddenLine xmlns:a14="http://schemas.microsoft.com/office/drawing/2010/main" w="9525">
                 <a:solidFill>
                   <a:srgbClr val="000000"/>
                 </a:solidFill>
@@ -3839,7 +3790,7 @@
               <a:defRPr/>
             </a:pPr>
             <a:r>
-              <a:rPr lang="en-US" sz="1600" dirty="0" smtClean="0">
+              <a:rPr lang="en-US" sz="1600" dirty="0">
                 <a:solidFill>
                   <a:schemeClr val="accent1">
                     <a:lumMod val="75000"/>
@@ -3848,7 +3799,7 @@
               </a:rPr>
               <a:t>Computer Graphics Support Group</a:t>
             </a:r>
-            <a:endParaRPr lang="ru-RU" sz="1600" dirty="0" smtClean="0">
+            <a:endParaRPr lang="ru-RU" sz="1600" dirty="0">
               <a:solidFill>
                 <a:schemeClr val="accent1">
                   <a:lumMod val="75000"/>
@@ -3861,7 +3812,7 @@
               <a:defRPr/>
             </a:pPr>
             <a:r>
-              <a:rPr lang="ru-RU" sz="1600" dirty="0" smtClean="0">
+              <a:rPr lang="ru-RU" sz="1600" dirty="0">
                 <a:solidFill>
                   <a:schemeClr val="accent1">
                     <a:lumMod val="75000"/>
@@ -3870,13 +3821,6 @@
               </a:rPr>
               <a:t>Санкт-Петербургский губернаторский физико-математический лицей № 30</a:t>
             </a:r>
-            <a:endParaRPr lang="ru-RU" sz="1600" dirty="0">
-              <a:solidFill>
-                <a:schemeClr val="accent1">
-                  <a:lumMod val="75000"/>
-                </a:schemeClr>
-              </a:solidFill>
-            </a:endParaRPr>
           </a:p>
         </p:txBody>
       </p:sp>
@@ -3907,7 +3851,7 @@
     </p:spTree>
     <p:extLst>
       <p:ext uri="{BB962C8B-B14F-4D97-AF65-F5344CB8AC3E}">
-        <p14:creationId xmlns="" xmlns:p14="http://schemas.microsoft.com/office/powerpoint/2010/main" val="351136565"/>
+        <p14:creationId xmlns:p14="http://schemas.microsoft.com/office/powerpoint/2010/main" val="351136565"/>
       </p:ext>
     </p:extLst>
   </p:cSld>
@@ -3925,13 +3869,6 @@
     <p:sldLayoutId id="2147483683" r:id="rId10"/>
     <p:sldLayoutId id="2147483684" r:id="rId11"/>
   </p:sldLayoutIdLst>
-  <p:timing>
-    <p:tnLst>
-      <p:par>
-        <p:cTn id="1" dur="indefinite" restart="never" nodeType="tmRoot"/>
-      </p:par>
-    </p:tnLst>
-  </p:timing>
   <p:txStyles>
     <p:titleStyle>
       <a:lvl1pPr algn="l" defTabSz="914400" rtl="0" eaLnBrk="1" latinLnBrk="0" hangingPunct="1">
@@ -4254,14 +4191,13 @@
           <a:p>
             <a:pPr algn="ctr"/>
             <a:r>
-              <a:rPr lang="en-US" dirty="0" smtClean="0"/>
+              <a:rPr lang="en-US" dirty="0"/>
               <a:t>JavaScript </a:t>
             </a:r>
             <a:r>
-              <a:rPr lang="ru-RU" dirty="0" smtClean="0"/>
+              <a:rPr lang="ru-RU" dirty="0"/>
               <a:t>и его синтаксис</a:t>
             </a:r>
-            <a:endParaRPr lang="ru-RU" dirty="0"/>
           </a:p>
         </p:txBody>
       </p:sp>
@@ -4273,10 +4209,10 @@
         </p:nvGrpSpPr>
         <p:grpSpPr>
           <a:xfrm>
-            <a:off x="847373" y="952066"/>
-            <a:ext cx="8155473" cy="1907555"/>
-            <a:chOff x="927154" y="1037984"/>
-            <a:chExt cx="8155473" cy="1907555"/>
+            <a:off x="849945" y="952066"/>
+            <a:ext cx="8152901" cy="1894736"/>
+            <a:chOff x="929726" y="1037984"/>
+            <a:chExt cx="8152901" cy="1894736"/>
           </a:xfrm>
         </p:grpSpPr>
         <p:grpSp>
@@ -4287,10 +4223,10 @@
           </p:nvGrpSpPr>
           <p:grpSpPr>
             <a:xfrm>
-              <a:off x="927154" y="1037984"/>
-              <a:ext cx="8155473" cy="1907555"/>
-              <a:chOff x="-46866" y="1395687"/>
-              <a:chExt cx="9579924" cy="2401498"/>
+              <a:off x="929726" y="1037984"/>
+              <a:ext cx="8152901" cy="1894736"/>
+              <a:chOff x="-43845" y="1395687"/>
+              <a:chExt cx="9576903" cy="2385359"/>
             </a:xfrm>
           </p:grpSpPr>
           <p:grpSp>
@@ -4527,18 +4463,9 @@
                 <a:lstStyle/>
                 <a:p>
                   <a:r>
-                    <a:rPr lang="ru-RU" sz="1600" b="1" dirty="0" smtClean="0"/>
-                    <a:t>Объектно</a:t>
+                    <a:rPr lang="ru-RU" sz="1600" b="1" dirty="0"/>
+                    <a:t>Объектно-ориентированный</a:t>
                   </a:r>
-                  <a:r>
-                    <a:rPr lang="ru-RU" sz="1600" b="1" dirty="0"/>
-                    <a:t>-</a:t>
-                  </a:r>
-                  <a:r>
-                    <a:rPr lang="ru-RU" sz="1600" b="1" dirty="0" smtClean="0"/>
-                    <a:t>ориентированный</a:t>
-                  </a:r>
-                  <a:endParaRPr lang="ru-RU" sz="1600" b="1" dirty="0"/>
                 </a:p>
               </p:txBody>
             </p:sp>
@@ -4565,10 +4492,9 @@
                 <a:lstStyle/>
                 <a:p>
                   <a:r>
-                    <a:rPr lang="ru-RU" sz="1600" b="1" dirty="0" smtClean="0"/>
+                    <a:rPr lang="ru-RU" sz="1600" b="1" dirty="0"/>
                     <a:t>Функциональный</a:t>
                   </a:r>
-                  <a:endParaRPr lang="ru-RU" sz="1600" b="1" dirty="0"/>
                 </a:p>
               </p:txBody>
             </p:sp>
@@ -4595,30 +4521,17 @@
                 <a:lstStyle/>
                 <a:p>
                   <a:r>
-                    <a:rPr lang="ru-RU" sz="1600" b="1" dirty="0" smtClean="0"/>
+                    <a:rPr lang="ru-RU" sz="1600" b="1" dirty="0"/>
                     <a:t>Интерпретируемый</a:t>
                   </a:r>
                   <a:r>
-                    <a:rPr lang="en-US" sz="1600" b="1" dirty="0" smtClean="0"/>
-                    <a:t> </a:t>
+                    <a:rPr lang="en-US" sz="1600" b="1" dirty="0"/>
+                    <a:t>  </a:t>
                   </a:r>
                   <a:r>
-                    <a:rPr lang="en-US" sz="1600" b="1" dirty="0" smtClean="0"/>
-                    <a:t> </a:t>
+                    <a:rPr lang="ru-RU" sz="1600" b="1" dirty="0"/>
+                    <a:t>и динамически типизированный</a:t>
                   </a:r>
-                  <a:r>
-                    <a:rPr lang="ru-RU" sz="1600" b="1" dirty="0" smtClean="0"/>
-                    <a:t>и </a:t>
-                  </a:r>
-                  <a:r>
-                    <a:rPr lang="ru-RU" sz="1600" b="1" dirty="0" smtClean="0"/>
-                    <a:t>динамически </a:t>
-                  </a:r>
-                  <a:r>
-                    <a:rPr lang="ru-RU" sz="1600" b="1" dirty="0" smtClean="0"/>
-                    <a:t>типизированный</a:t>
-                  </a:r>
-                  <a:endParaRPr lang="ru-RU" sz="1600" b="1" dirty="0"/>
                 </a:p>
               </p:txBody>
             </p:sp>
@@ -4645,10 +4558,9 @@
                 <a:lstStyle/>
                 <a:p>
                   <a:r>
-                    <a:rPr lang="ru-RU" sz="1600" b="1" dirty="0" smtClean="0"/>
+                    <a:rPr lang="ru-RU" sz="1600" b="1" dirty="0"/>
                     <a:t>Однопоточный</a:t>
                   </a:r>
-                  <a:endParaRPr lang="ru-RU" sz="1600" b="1" dirty="0"/>
                 </a:p>
               </p:txBody>
             </p:sp>
@@ -4661,8 +4573,8 @@
             </p:nvSpPr>
             <p:spPr>
               <a:xfrm>
-                <a:off x="-46866" y="3429086"/>
-                <a:ext cx="1489675" cy="368099"/>
+                <a:off x="594956" y="3412947"/>
+                <a:ext cx="1530576" cy="368099"/>
               </a:xfrm>
               <a:prstGeom prst="rect">
                 <a:avLst/>
@@ -4694,10 +4606,9 @@
               <a:p>
                 <a:pPr algn="ctr"/>
                 <a:r>
-                  <a:rPr lang="ru-RU" sz="1300" b="1" dirty="0" smtClean="0"/>
+                  <a:rPr lang="ru-RU" sz="1300" b="1" dirty="0"/>
                   <a:t>Базовые типы</a:t>
                 </a:r>
-                <a:endParaRPr lang="ru-RU" sz="1300" b="1" dirty="0"/>
               </a:p>
             </p:txBody>
           </p:sp>
@@ -4800,8 +4711,8 @@
         </p:blipFill>
         <p:spPr bwMode="auto">
           <a:xfrm>
-            <a:off x="3635565" y="3120549"/>
-            <a:ext cx="1288422" cy="1187561"/>
+            <a:off x="3452749" y="2952045"/>
+            <a:ext cx="1471238" cy="1356066"/>
           </a:xfrm>
           <a:prstGeom prst="rect">
             <a:avLst/>
@@ -4830,8 +4741,8 @@
         </p:nvSpPr>
         <p:spPr>
           <a:xfrm>
-            <a:off x="3615791" y="2701219"/>
-            <a:ext cx="2950705" cy="292388"/>
+            <a:off x="3439687" y="2557529"/>
+            <a:ext cx="3330829" cy="292388"/>
           </a:xfrm>
           <a:prstGeom prst="rect">
             <a:avLst/>
@@ -4863,10 +4774,18 @@
           <a:p>
             <a:pPr algn="ctr"/>
             <a:r>
-              <a:rPr lang="en-US" sz="1300" b="1" dirty="0" smtClean="0"/>
+              <a:rPr lang="en-US" sz="1300" b="1" dirty="0">
+                <a:solidFill>
+                  <a:schemeClr val="tx1"/>
+                </a:solidFill>
+              </a:rPr>
               <a:t>JavaScript Object Notation (JSON)</a:t>
             </a:r>
-            <a:endParaRPr lang="ru-RU" sz="1300" b="1" dirty="0"/>
+            <a:endParaRPr lang="ru-RU" sz="1300" b="1" dirty="0">
+              <a:solidFill>
+                <a:schemeClr val="tx1"/>
+              </a:solidFill>
+            </a:endParaRPr>
           </a:p>
         </p:txBody>
       </p:sp>
@@ -4887,8 +4806,8 @@
         </p:blipFill>
         <p:spPr bwMode="auto">
           <a:xfrm>
-            <a:off x="5075234" y="3112050"/>
-            <a:ext cx="1471238" cy="1208336"/>
+            <a:off x="5075234" y="2938769"/>
+            <a:ext cx="1682220" cy="1381617"/>
           </a:xfrm>
           <a:prstGeom prst="rect">
             <a:avLst/>
@@ -4917,17 +4836,15 @@
           </p:cNvPicPr>
           <p:nvPr/>
         </p:nvPicPr>
-        <p:blipFill>
+        <p:blipFill rotWithShape="1">
           <a:blip r:embed="rId8"/>
-          <a:srcRect/>
-          <a:stretch>
-            <a:fillRect/>
-          </a:stretch>
+          <a:srcRect t="1391" b="1391"/>
+          <a:stretch/>
         </p:blipFill>
         <p:spPr bwMode="auto">
           <a:xfrm>
-            <a:off x="871249" y="2963234"/>
-            <a:ext cx="1229425" cy="1351016"/>
+            <a:off x="1416623" y="2949694"/>
+            <a:ext cx="1257272" cy="1343178"/>
           </a:xfrm>
           <a:prstGeom prst="rect">
             <a:avLst/>
@@ -4951,20 +4868,630 @@
     </p:spTree>
     <p:extLst>
       <p:ext uri="{BB962C8B-B14F-4D97-AF65-F5344CB8AC3E}">
-        <p14:creationId xmlns="" xmlns:p14="http://schemas.microsoft.com/office/powerpoint/2010/main" val="2345007572"/>
+        <p14:creationId xmlns:p14="http://schemas.microsoft.com/office/powerpoint/2010/main" val="2345007572"/>
       </p:ext>
     </p:extLst>
   </p:cSld>
   <p:clrMapOvr>
     <a:masterClrMapping/>
   </p:clrMapOvr>
-  <p:timing>
-    <p:tnLst>
-      <p:par>
-        <p:cTn id="1" dur="indefinite" restart="never" nodeType="tmRoot"/>
-      </p:par>
-    </p:tnLst>
-  </p:timing>
+</p:sld>
+</file>
+
+<file path=ppt/slides/slide2.xml><?xml version="1.0" encoding="utf-8"?>
+<p:sld xmlns:a="http://schemas.openxmlformats.org/drawingml/2006/main" xmlns:r="http://schemas.openxmlformats.org/officeDocument/2006/relationships" xmlns:p="http://schemas.openxmlformats.org/presentationml/2006/main">
+  <p:cSld>
+    <p:spTree>
+      <p:nvGrpSpPr>
+        <p:cNvPr id="1" name=""/>
+        <p:cNvGrpSpPr/>
+        <p:nvPr/>
+      </p:nvGrpSpPr>
+      <p:grpSpPr>
+        <a:xfrm>
+          <a:off x="0" y="0"/>
+          <a:ext cx="0" cy="0"/>
+          <a:chOff x="0" y="0"/>
+          <a:chExt cx="0" cy="0"/>
+        </a:xfrm>
+      </p:grpSpPr>
+      <p:sp>
+        <p:nvSpPr>
+          <p:cNvPr id="5" name="Заголовок 1">
+            <a:extLst>
+              <a:ext uri="{FF2B5EF4-FFF2-40B4-BE49-F238E27FC236}">
+                <a16:creationId xmlns:a16="http://schemas.microsoft.com/office/drawing/2014/main" id="{6D6CE34D-4A0C-D0AB-8AF5-26FE53895D01}"/>
+              </a:ext>
+            </a:extLst>
+          </p:cNvPr>
+          <p:cNvSpPr>
+            <a:spLocks noGrp="1"/>
+          </p:cNvSpPr>
+          <p:nvPr>
+            <p:ph type="title"/>
+          </p:nvPr>
+        </p:nvSpPr>
+        <p:spPr>
+          <a:xfrm>
+            <a:off x="450669" y="55761"/>
+            <a:ext cx="8229600" cy="857250"/>
+          </a:xfrm>
+        </p:spPr>
+        <p:txBody>
+          <a:bodyPr>
+            <a:normAutofit fontScale="90000"/>
+          </a:bodyPr>
+          <a:lstStyle/>
+          <a:p>
+            <a:pPr algn="ctr"/>
+            <a:r>
+              <a:rPr lang="ru-RU" dirty="0"/>
+              <a:t>Финальный проект. </a:t>
+            </a:r>
+            <a:r>
+              <a:rPr lang="en-US" dirty="0"/>
+              <a:t>TP5</a:t>
+            </a:r>
+            <a:r>
+              <a:rPr lang="ru-RU" dirty="0"/>
+              <a:t>. </a:t>
+            </a:r>
+            <a:br>
+              <a:rPr lang="ru-RU" dirty="0"/>
+            </a:br>
+            <a:r>
+              <a:rPr lang="en-US" dirty="0"/>
+              <a:t>“Multiplayer </a:t>
+            </a:r>
+            <a:r>
+              <a:rPr lang="ru-RU" dirty="0"/>
+              <a:t>3</a:t>
+            </a:r>
+            <a:r>
+              <a:rPr lang="en-US" dirty="0"/>
+              <a:t>d labyrinth“</a:t>
+            </a:r>
+            <a:endParaRPr lang="ru-RU" dirty="0"/>
+          </a:p>
+        </p:txBody>
+      </p:sp>
+      <p:grpSp>
+        <p:nvGrpSpPr>
+          <p:cNvPr id="16" name="Группа 15">
+            <a:extLst>
+              <a:ext uri="{FF2B5EF4-FFF2-40B4-BE49-F238E27FC236}">
+                <a16:creationId xmlns:a16="http://schemas.microsoft.com/office/drawing/2014/main" id="{7D15FABE-C14E-3B75-95DD-FF32676D6EF4}"/>
+              </a:ext>
+            </a:extLst>
+          </p:cNvPr>
+          <p:cNvGrpSpPr/>
+          <p:nvPr/>
+        </p:nvGrpSpPr>
+        <p:grpSpPr>
+          <a:xfrm>
+            <a:off x="598011" y="1174875"/>
+            <a:ext cx="8663616" cy="3135323"/>
+            <a:chOff x="216592" y="1332740"/>
+            <a:chExt cx="9813976" cy="3551630"/>
+          </a:xfrm>
+        </p:grpSpPr>
+        <p:pic>
+          <p:nvPicPr>
+            <p:cNvPr id="4" name="Picture 10">
+              <a:extLst>
+                <a:ext uri="{FF2B5EF4-FFF2-40B4-BE49-F238E27FC236}">
+                  <a16:creationId xmlns:a16="http://schemas.microsoft.com/office/drawing/2014/main" id="{8123A783-3ABE-EA59-5F0B-16EC8A3D705F}"/>
+                </a:ext>
+              </a:extLst>
+            </p:cNvPr>
+            <p:cNvPicPr>
+              <a:picLocks noChangeAspect="1" noChangeArrowheads="1"/>
+            </p:cNvPicPr>
+            <p:nvPr/>
+          </p:nvPicPr>
+          <p:blipFill>
+            <a:blip r:embed="rId2" cstate="print"/>
+            <a:srcRect b="3226"/>
+            <a:stretch>
+              <a:fillRect/>
+            </a:stretch>
+          </p:blipFill>
+          <p:spPr bwMode="auto">
+            <a:xfrm>
+              <a:off x="216592" y="1399148"/>
+              <a:ext cx="4113422" cy="2500330"/>
+            </a:xfrm>
+            <a:prstGeom prst="rect">
+              <a:avLst/>
+            </a:prstGeom>
+            <a:ln w="38100" cap="sq">
+              <a:solidFill>
+                <a:srgbClr val="000000"/>
+              </a:solidFill>
+              <a:prstDash val="solid"/>
+              <a:miter lim="800000"/>
+            </a:ln>
+            <a:effectLst>
+              <a:outerShdw blurRad="50800" dist="38100" dir="2700000" algn="tl" rotWithShape="0">
+                <a:srgbClr val="000000">
+                  <a:alpha val="43000"/>
+                </a:srgbClr>
+              </a:outerShdw>
+            </a:effectLst>
+          </p:spPr>
+        </p:pic>
+        <p:grpSp>
+          <p:nvGrpSpPr>
+            <p:cNvPr id="6" name="Группа 5">
+              <a:extLst>
+                <a:ext uri="{FF2B5EF4-FFF2-40B4-BE49-F238E27FC236}">
+                  <a16:creationId xmlns:a16="http://schemas.microsoft.com/office/drawing/2014/main" id="{30E72DCA-08D7-BF0D-1614-A067D5D43815}"/>
+                </a:ext>
+              </a:extLst>
+            </p:cNvPr>
+            <p:cNvGrpSpPr/>
+            <p:nvPr/>
+          </p:nvGrpSpPr>
+          <p:grpSpPr>
+            <a:xfrm>
+              <a:off x="4319025" y="1332740"/>
+              <a:ext cx="5711543" cy="3551630"/>
+              <a:chOff x="4087437" y="571722"/>
+              <a:chExt cx="5991679" cy="3725834"/>
+            </a:xfrm>
+          </p:grpSpPr>
+          <p:grpSp>
+            <p:nvGrpSpPr>
+              <p:cNvPr id="7" name="Группа 6">
+                <a:extLst>
+                  <a:ext uri="{FF2B5EF4-FFF2-40B4-BE49-F238E27FC236}">
+                    <a16:creationId xmlns:a16="http://schemas.microsoft.com/office/drawing/2014/main" id="{073D9080-B4B0-B4E5-2960-4508C67D6FEA}"/>
+                  </a:ext>
+                </a:extLst>
+              </p:cNvPr>
+              <p:cNvGrpSpPr/>
+              <p:nvPr/>
+            </p:nvGrpSpPr>
+            <p:grpSpPr>
+              <a:xfrm>
+                <a:off x="5922113" y="571722"/>
+                <a:ext cx="3672153" cy="1866672"/>
+                <a:chOff x="4275116" y="312268"/>
+                <a:chExt cx="4920687" cy="2501336"/>
+              </a:xfrm>
+            </p:grpSpPr>
+            <p:pic>
+              <p:nvPicPr>
+                <p:cNvPr id="11" name="Picture 5">
+                  <a:extLst>
+                    <a:ext uri="{FF2B5EF4-FFF2-40B4-BE49-F238E27FC236}">
+                      <a16:creationId xmlns:a16="http://schemas.microsoft.com/office/drawing/2014/main" id="{8FD1F3C5-3F69-5269-C7EB-A1A182FD752A}"/>
+                    </a:ext>
+                  </a:extLst>
+                </p:cNvPr>
+                <p:cNvPicPr>
+                  <a:picLocks noChangeAspect="1" noChangeArrowheads="1"/>
+                </p:cNvPicPr>
+                <p:nvPr/>
+              </p:nvPicPr>
+              <p:blipFill>
+                <a:blip r:embed="rId3" cstate="print"/>
+                <a:srcRect/>
+                <a:stretch>
+                  <a:fillRect/>
+                </a:stretch>
+              </p:blipFill>
+              <p:spPr bwMode="auto">
+                <a:xfrm>
+                  <a:off x="6725857" y="312268"/>
+                  <a:ext cx="2010270" cy="1679311"/>
+                </a:xfrm>
+                <a:prstGeom prst="rect">
+                  <a:avLst/>
+                </a:prstGeom>
+                <a:ln>
+                  <a:noFill/>
+                </a:ln>
+                <a:effectLst>
+                  <a:outerShdw blurRad="190500" algn="tl" rotWithShape="0">
+                    <a:srgbClr val="000000">
+                      <a:alpha val="70000"/>
+                    </a:srgbClr>
+                  </a:outerShdw>
+                </a:effectLst>
+              </p:spPr>
+            </p:pic>
+            <p:pic>
+              <p:nvPicPr>
+                <p:cNvPr id="12" name="Picture 8">
+                  <a:extLst>
+                    <a:ext uri="{FF2B5EF4-FFF2-40B4-BE49-F238E27FC236}">
+                      <a16:creationId xmlns:a16="http://schemas.microsoft.com/office/drawing/2014/main" id="{A5B11DF3-49E4-0ABE-D653-9CC1EF2F0421}"/>
+                    </a:ext>
+                  </a:extLst>
+                </p:cNvPr>
+                <p:cNvPicPr>
+                  <a:picLocks noChangeAspect="1" noChangeArrowheads="1"/>
+                </p:cNvPicPr>
+                <p:nvPr/>
+              </p:nvPicPr>
+              <p:blipFill>
+                <a:blip r:embed="rId4"/>
+                <a:srcRect/>
+                <a:stretch>
+                  <a:fillRect/>
+                </a:stretch>
+              </p:blipFill>
+              <p:spPr bwMode="auto">
+                <a:xfrm rot="16200000">
+                  <a:off x="4442498" y="398896"/>
+                  <a:ext cx="1567273" cy="1576389"/>
+                </a:xfrm>
+                <a:prstGeom prst="rect">
+                  <a:avLst/>
+                </a:prstGeom>
+                <a:ln>
+                  <a:noFill/>
+                </a:ln>
+                <a:effectLst>
+                  <a:outerShdw blurRad="190500" algn="tl" rotWithShape="0">
+                    <a:srgbClr val="000000">
+                      <a:alpha val="70000"/>
+                    </a:srgbClr>
+                  </a:outerShdw>
+                </a:effectLst>
+              </p:spPr>
+            </p:pic>
+            <p:sp>
+              <p:nvSpPr>
+                <p:cNvPr id="13" name="Стрелка вправо 19">
+                  <a:extLst>
+                    <a:ext uri="{FF2B5EF4-FFF2-40B4-BE49-F238E27FC236}">
+                      <a16:creationId xmlns:a16="http://schemas.microsoft.com/office/drawing/2014/main" id="{D87924F3-95A5-AABD-EE96-D84BD13D8C4B}"/>
+                    </a:ext>
+                  </a:extLst>
+                </p:cNvPr>
+                <p:cNvSpPr/>
+                <p:nvPr/>
+              </p:nvSpPr>
+              <p:spPr>
+                <a:xfrm>
+                  <a:off x="6135549" y="482598"/>
+                  <a:ext cx="486200" cy="404339"/>
+                </a:xfrm>
+                <a:prstGeom prst="rightArrow">
+                  <a:avLst/>
+                </a:prstGeom>
+                <a:ln>
+                  <a:noFill/>
+                </a:ln>
+              </p:spPr>
+              <p:style>
+                <a:lnRef idx="2">
+                  <a:schemeClr val="accent2">
+                    <a:shade val="50000"/>
+                  </a:schemeClr>
+                </a:lnRef>
+                <a:fillRef idx="1">
+                  <a:schemeClr val="accent2"/>
+                </a:fillRef>
+                <a:effectRef idx="0">
+                  <a:schemeClr val="accent2"/>
+                </a:effectRef>
+                <a:fontRef idx="minor">
+                  <a:schemeClr val="lt1"/>
+                </a:fontRef>
+              </p:style>
+              <p:txBody>
+                <a:bodyPr rtlCol="0" anchor="ctr"/>
+                <a:lstStyle/>
+                <a:p>
+                  <a:pPr algn="ctr"/>
+                  <a:endParaRPr lang="ru-RU" dirty="0"/>
+                </a:p>
+              </p:txBody>
+            </p:sp>
+            <p:sp>
+              <p:nvSpPr>
+                <p:cNvPr id="14" name="TextBox 13">
+                  <a:extLst>
+                    <a:ext uri="{FF2B5EF4-FFF2-40B4-BE49-F238E27FC236}">
+                      <a16:creationId xmlns:a16="http://schemas.microsoft.com/office/drawing/2014/main" id="{376E1916-6DB2-3140-BDFB-C4C66DFECA98}"/>
+                    </a:ext>
+                  </a:extLst>
+                </p:cNvPr>
+                <p:cNvSpPr txBox="1"/>
+                <p:nvPr/>
+              </p:nvSpPr>
+              <p:spPr>
+                <a:xfrm>
+                  <a:off x="4275116" y="1991572"/>
+                  <a:ext cx="4920687" cy="822032"/>
+                </a:xfrm>
+                <a:prstGeom prst="rect">
+                  <a:avLst/>
+                </a:prstGeom>
+                <a:noFill/>
+              </p:spPr>
+              <p:txBody>
+                <a:bodyPr wrap="square" rtlCol="0">
+                  <a:spAutoFit/>
+                </a:bodyPr>
+                <a:lstStyle/>
+                <a:p>
+                  <a:r>
+                    <a:rPr lang="ru-RU" sz="1600" b="1" dirty="0"/>
+                    <a:t>Построение лабиринта по изображению с планом комнат</a:t>
+                  </a:r>
+                </a:p>
+              </p:txBody>
+            </p:sp>
+          </p:grpSp>
+          <p:sp>
+            <p:nvSpPr>
+              <p:cNvPr id="8" name="TextBox 7">
+                <a:extLst>
+                  <a:ext uri="{FF2B5EF4-FFF2-40B4-BE49-F238E27FC236}">
+                    <a16:creationId xmlns:a16="http://schemas.microsoft.com/office/drawing/2014/main" id="{119F9A6D-BEE1-85D6-E250-F711CB2B2B0E}"/>
+                  </a:ext>
+                </a:extLst>
+              </p:cNvPr>
+              <p:cNvSpPr txBox="1"/>
+              <p:nvPr/>
+            </p:nvSpPr>
+            <p:spPr>
+              <a:xfrm>
+                <a:off x="5908428" y="2798007"/>
+                <a:ext cx="4170688" cy="1499549"/>
+              </a:xfrm>
+              <a:prstGeom prst="rect">
+                <a:avLst/>
+              </a:prstGeom>
+              <a:noFill/>
+            </p:spPr>
+            <p:txBody>
+              <a:bodyPr wrap="square" rtlCol="0">
+                <a:spAutoFit/>
+              </a:bodyPr>
+              <a:lstStyle/>
+              <a:p>
+                <a:r>
+                  <a:rPr lang="en-US" sz="2800" b="1" dirty="0"/>
+                  <a:t>Multiplayer,</a:t>
+                </a:r>
+                <a:endParaRPr lang="ru-RU" b="1" dirty="0"/>
+              </a:p>
+              <a:p>
+                <a:r>
+                  <a:rPr lang="ru-RU" sz="1600" b="1" dirty="0"/>
+                  <a:t>Загрузка аватарок из </a:t>
+                </a:r>
+                <a:r>
+                  <a:rPr lang="en-US" sz="1600" b="1" dirty="0"/>
+                  <a:t>Gravatar,</a:t>
+                </a:r>
+              </a:p>
+              <a:p>
+                <a:r>
+                  <a:rPr lang="ru-RU" sz="1600" b="1" dirty="0"/>
+                  <a:t>Загрузка моделей, </a:t>
+                </a:r>
+                <a:endParaRPr lang="en-US" sz="1600" b="1" dirty="0"/>
+              </a:p>
+              <a:p>
+                <a:r>
+                  <a:rPr lang="ru-RU" sz="1600" b="1" dirty="0"/>
+                  <a:t>Прозрачные модели</a:t>
+                </a:r>
+              </a:p>
+            </p:txBody>
+          </p:sp>
+          <p:sp>
+            <p:nvSpPr>
+              <p:cNvPr id="9" name="Стрелка вправо 25">
+                <a:extLst>
+                  <a:ext uri="{FF2B5EF4-FFF2-40B4-BE49-F238E27FC236}">
+                    <a16:creationId xmlns:a16="http://schemas.microsoft.com/office/drawing/2014/main" id="{6431C98E-BBEB-FCFA-FDC7-A702925A43BB}"/>
+                  </a:ext>
+                </a:extLst>
+              </p:cNvPr>
+              <p:cNvSpPr/>
+              <p:nvPr/>
+            </p:nvSpPr>
+            <p:spPr>
+              <a:xfrm>
+                <a:off x="7326029" y="1448253"/>
+                <a:ext cx="362836" cy="301746"/>
+              </a:xfrm>
+              <a:prstGeom prst="rightArrow">
+                <a:avLst/>
+              </a:prstGeom>
+              <a:ln>
+                <a:noFill/>
+              </a:ln>
+            </p:spPr>
+            <p:style>
+              <a:lnRef idx="2">
+                <a:schemeClr val="accent2">
+                  <a:shade val="50000"/>
+                </a:schemeClr>
+              </a:lnRef>
+              <a:fillRef idx="1">
+                <a:schemeClr val="accent2"/>
+              </a:fillRef>
+              <a:effectRef idx="0">
+                <a:schemeClr val="accent2"/>
+              </a:effectRef>
+              <a:fontRef idx="minor">
+                <a:schemeClr val="lt1"/>
+              </a:fontRef>
+            </p:style>
+            <p:txBody>
+              <a:bodyPr rtlCol="0" anchor="ctr"/>
+              <a:lstStyle/>
+              <a:p>
+                <a:pPr algn="ctr"/>
+                <a:endParaRPr lang="ru-RU" dirty="0"/>
+              </a:p>
+            </p:txBody>
+          </p:sp>
+          <p:pic>
+            <p:nvPicPr>
+              <p:cNvPr id="10" name="Picture 9">
+                <a:extLst>
+                  <a:ext uri="{FF2B5EF4-FFF2-40B4-BE49-F238E27FC236}">
+                    <a16:creationId xmlns:a16="http://schemas.microsoft.com/office/drawing/2014/main" id="{AEA29EDE-6173-79E1-18D5-115CCD123B3D}"/>
+                  </a:ext>
+                </a:extLst>
+              </p:cNvPr>
+              <p:cNvPicPr>
+                <a:picLocks noChangeAspect="1" noChangeArrowheads="1"/>
+              </p:cNvPicPr>
+              <p:nvPr/>
+            </p:nvPicPr>
+            <p:blipFill rotWithShape="1">
+              <a:blip r:embed="rId5" cstate="print"/>
+              <a:srcRect l="24675" t="12006" r="4240" b="6327"/>
+              <a:stretch/>
+            </p:blipFill>
+            <p:spPr bwMode="auto">
+              <a:xfrm>
+                <a:off x="4087437" y="1937504"/>
+                <a:ext cx="1734714" cy="2360052"/>
+              </a:xfrm>
+              <a:prstGeom prst="round2DiagRect">
+                <a:avLst>
+                  <a:gd name="adj1" fmla="val 16667"/>
+                  <a:gd name="adj2" fmla="val 0"/>
+                </a:avLst>
+              </a:prstGeom>
+              <a:ln w="88900" cap="sq">
+                <a:solidFill>
+                  <a:srgbClr val="FFFFFF"/>
+                </a:solidFill>
+                <a:miter lim="800000"/>
+              </a:ln>
+              <a:effectLst>
+                <a:outerShdw blurRad="254000" algn="tl" rotWithShape="0">
+                  <a:srgbClr val="000000">
+                    <a:alpha val="0"/>
+                  </a:srgbClr>
+                </a:outerShdw>
+              </a:effectLst>
+            </p:spPr>
+          </p:pic>
+        </p:grpSp>
+        <p:sp>
+          <p:nvSpPr>
+            <p:cNvPr id="15" name="Стрелка вправо 28">
+              <a:extLst>
+                <a:ext uri="{FF2B5EF4-FFF2-40B4-BE49-F238E27FC236}">
+                  <a16:creationId xmlns:a16="http://schemas.microsoft.com/office/drawing/2014/main" id="{24465B1B-7FCF-77AB-C111-1F18292E7F06}"/>
+                </a:ext>
+              </a:extLst>
+            </p:cNvPr>
+            <p:cNvSpPr/>
+            <p:nvPr/>
+          </p:nvSpPr>
+          <p:spPr>
+            <a:xfrm>
+              <a:off x="7398202" y="1812984"/>
+              <a:ext cx="345872" cy="287638"/>
+            </a:xfrm>
+            <a:prstGeom prst="rightArrow">
+              <a:avLst/>
+            </a:prstGeom>
+            <a:ln>
+              <a:noFill/>
+            </a:ln>
+          </p:spPr>
+          <p:style>
+            <a:lnRef idx="2">
+              <a:schemeClr val="accent2">
+                <a:shade val="50000"/>
+              </a:schemeClr>
+            </a:lnRef>
+            <a:fillRef idx="1">
+              <a:schemeClr val="accent2"/>
+            </a:fillRef>
+            <a:effectRef idx="0">
+              <a:schemeClr val="accent2"/>
+            </a:effectRef>
+            <a:fontRef idx="minor">
+              <a:schemeClr val="lt1"/>
+            </a:fontRef>
+          </p:style>
+          <p:txBody>
+            <a:bodyPr rtlCol="0" anchor="ctr"/>
+            <a:lstStyle/>
+            <a:p>
+              <a:pPr algn="ctr"/>
+              <a:endParaRPr lang="ru-RU" dirty="0"/>
+            </a:p>
+          </p:txBody>
+        </p:sp>
+      </p:grpSp>
+      <p:sp>
+        <p:nvSpPr>
+          <p:cNvPr id="17" name="TextBox 16">
+            <a:extLst>
+              <a:ext uri="{FF2B5EF4-FFF2-40B4-BE49-F238E27FC236}">
+                <a16:creationId xmlns:a16="http://schemas.microsoft.com/office/drawing/2014/main" id="{9C97368D-FF3F-CED8-412A-9A9E1C5CFBE0}"/>
+              </a:ext>
+            </a:extLst>
+          </p:cNvPr>
+          <p:cNvSpPr txBox="1"/>
+          <p:nvPr/>
+        </p:nvSpPr>
+        <p:spPr>
+          <a:xfrm>
+            <a:off x="471065" y="3470289"/>
+            <a:ext cx="3596690" cy="769441"/>
+          </a:xfrm>
+          <a:prstGeom prst="rect">
+            <a:avLst/>
+          </a:prstGeom>
+          <a:noFill/>
+        </p:spPr>
+        <p:txBody>
+          <a:bodyPr wrap="square" rtlCol="0">
+            <a:spAutoFit/>
+          </a:bodyPr>
+          <a:lstStyle/>
+          <a:p>
+            <a:r>
+              <a:rPr lang="en-US" sz="2800" b="1" dirty="0"/>
+              <a:t>Realtime shader editor</a:t>
+            </a:r>
+            <a:endParaRPr lang="ru-RU" sz="2800" b="1" dirty="0"/>
+          </a:p>
+          <a:p>
+            <a:pPr algn="ctr"/>
+            <a:r>
+              <a:rPr lang="ru-RU" sz="1600" b="1" dirty="0"/>
+              <a:t>(</a:t>
+            </a:r>
+            <a:r>
+              <a:rPr lang="en-US" sz="1600" b="1" dirty="0"/>
+              <a:t>multiplayer supported</a:t>
+            </a:r>
+            <a:r>
+              <a:rPr lang="ru-RU" sz="1600" b="1" dirty="0"/>
+              <a:t>)</a:t>
+            </a:r>
+          </a:p>
+        </p:txBody>
+      </p:sp>
+    </p:spTree>
+    <p:extLst>
+      <p:ext uri="{BB962C8B-B14F-4D97-AF65-F5344CB8AC3E}">
+        <p14:creationId xmlns:p14="http://schemas.microsoft.com/office/powerpoint/2010/main" val="3235924914"/>
+      </p:ext>
+    </p:extLst>
+  </p:cSld>
+  <p:clrMapOvr>
+    <a:masterClrMapping/>
+  </p:clrMapOvr>
 </p:sld>
 </file>
 
@@ -5223,7 +5750,7 @@
   <a:extraClrSchemeLst/>
   <a:extLst>
     <a:ext uri="{05A4C25C-085E-4340-85A3-A5531E510DB2}">
-      <thm15:themeFamily xmlns="" xmlns:thm15="http://schemas.microsoft.com/office/thememl/2012/main" name="Office Theme" id="{62F939B6-93AF-4DB8-9C6B-D6C7DFDC589F}" vid="{4A3C46E8-61CC-4603-A589-7422A47A8E4A}"/>
+      <thm15:themeFamily xmlns:thm15="http://schemas.microsoft.com/office/thememl/2012/main" name="Office Theme" id="{62F939B6-93AF-4DB8-9C6B-D6C7DFDC589F}" vid="{4A3C46E8-61CC-4603-A589-7422A47A8E4A}"/>
     </a:ext>
   </a:extLst>
 </a:theme>
@@ -5484,7 +6011,7 @@
   <a:extraClrSchemeLst/>
   <a:extLst>
     <a:ext uri="{05A4C25C-085E-4340-85A3-A5531E510DB2}">
-      <thm15:themeFamily xmlns="" xmlns:thm15="http://schemas.microsoft.com/office/thememl/2012/main" name="Office Theme" id="{62F939B6-93AF-4DB8-9C6B-D6C7DFDC589F}" vid="{4A3C46E8-61CC-4603-A589-7422A47A8E4A}"/>
+      <thm15:themeFamily xmlns:thm15="http://schemas.microsoft.com/office/thememl/2012/main" name="Office Theme" id="{62F939B6-93AF-4DB8-9C6B-D6C7DFDC589F}" vid="{4A3C46E8-61CC-4603-A589-7422A47A8E4A}"/>
     </a:ext>
   </a:extLst>
 </a:theme>

</xml_diff>